<commit_message>
first draft for the prez with background
</commit_message>
<xml_diff>
--- a/ez18n-slides/apt_in_nutshell.pptx
+++ b/ez18n-slides/apt_in_nutshell.pptx
@@ -362,6 +362,13 @@
   <p:clrMapOvr>
     <a:masterClrMapping/>
   </p:clrMapOvr>
+  <p:timing>
+    <p:tnLst>
+      <p:par>
+        <p:cTn id="1" dur="indefinite" restart="never" nodeType="tmRoot"/>
+      </p:par>
+    </p:tnLst>
+  </p:timing>
 </p:sldLayout>
 </file>
 
@@ -882,6 +889,13 @@
   <p:clrMapOvr>
     <a:masterClrMapping/>
   </p:clrMapOvr>
+  <p:timing>
+    <p:tnLst>
+      <p:par>
+        <p:cTn id="1" dur="indefinite" restart="never" nodeType="tmRoot"/>
+      </p:par>
+    </p:tnLst>
+  </p:timing>
 </p:sldLayout>
 </file>
 
@@ -2606,6 +2620,36 @@
           <a:chExt cx="0" cy="0"/>
         </a:xfrm>
       </p:grpSpPr>
+      <p:pic>
+        <p:nvPicPr>
+          <p:cNvPr id="8" name="Image 7"/>
+          <p:cNvPicPr>
+            <a:picLocks noChangeAspect="1"/>
+          </p:cNvPicPr>
+          <p:nvPr userDrawn="1"/>
+        </p:nvPicPr>
+        <p:blipFill>
+          <a:blip r:embed="rId13" cstate="print">
+            <a:extLst>
+              <a:ext uri="{28A0092B-C50C-407E-A947-70E740481C1C}">
+                <a14:useLocalDpi xmlns:a14="http://schemas.microsoft.com/office/drawing/2010/main" val="0"/>
+              </a:ext>
+            </a:extLst>
+          </a:blip>
+          <a:stretch>
+            <a:fillRect/>
+          </a:stretch>
+        </p:blipFill>
+        <p:spPr>
+          <a:xfrm>
+            <a:off x="507" y="0"/>
+            <a:ext cx="9142985" cy="6858000"/>
+          </a:xfrm>
+          <a:prstGeom prst="rect">
+            <a:avLst/>
+          </a:prstGeom>
+        </p:spPr>
+      </p:pic>
       <p:sp>
         <p:nvSpPr>
           <p:cNvPr id="2" name="Espace réservé du titre 1"/>
@@ -2841,6 +2885,13 @@
     <p:sldLayoutId id="2147483658" r:id="rId10"/>
     <p:sldLayoutId id="2147483659" r:id="rId11"/>
   </p:sldLayoutIdLst>
+  <p:timing>
+    <p:tnLst>
+      <p:par>
+        <p:cTn id="1" dur="indefinite" restart="never" nodeType="tmRoot"/>
+      </p:par>
+    </p:tnLst>
+  </p:timing>
   <p:txStyles>
     <p:titleStyle>
       <a:lvl1pPr algn="ctr" defTabSz="914400" rtl="0" eaLnBrk="1" latinLnBrk="0" hangingPunct="1">
@@ -3647,15 +3698,15 @@
             </a:r>
             <a:r>
               <a:rPr lang="fr-FR" dirty="0" smtClean="0"/>
-              <a:t> (</a:t>
-            </a:r>
-            <a:r>
-              <a:rPr lang="fr-FR" dirty="0" err="1" smtClean="0"/>
-              <a:t>developement</a:t>
-            </a:r>
-            <a:r>
-              <a:rPr lang="fr-FR" dirty="0" smtClean="0"/>
-              <a:t>/recette/production)</a:t>
+              <a:t> </a:t>
+            </a:r>
+            <a:r>
+              <a:rPr lang="fr-FR" dirty="0" smtClean="0"/>
+              <a:t>(développement/recette/production</a:t>
+            </a:r>
+            <a:r>
+              <a:rPr lang="fr-FR" dirty="0" smtClean="0"/>
+              <a:t>)</a:t>
             </a:r>
           </a:p>
           <a:p>
@@ -4225,12 +4276,12 @@
         <p:spPr>
           <a:xfrm>
             <a:off x="457200" y="1371601"/>
-            <a:ext cx="8077200" cy="2438399"/>
+            <a:ext cx="8229600" cy="1904999"/>
           </a:xfrm>
         </p:spPr>
         <p:txBody>
           <a:bodyPr>
-            <a:normAutofit fontScale="85000" lnSpcReduction="10000"/>
+            <a:normAutofit fontScale="77500" lnSpcReduction="20000"/>
           </a:bodyPr>
           <a:lstStyle/>
           <a:p>
@@ -4306,15 +4357,20 @@
         </p:blipFill>
         <p:spPr bwMode="auto">
           <a:xfrm>
-            <a:off x="530514" y="3707712"/>
-            <a:ext cx="6860886" cy="2159688"/>
+            <a:off x="545399" y="3200400"/>
+            <a:ext cx="6477000" cy="2038847"/>
           </a:xfrm>
           <a:prstGeom prst="rect">
             <a:avLst/>
           </a:prstGeom>
           <a:noFill/>
-          <a:ln>
-            <a:noFill/>
+          <a:ln w="28575">
+            <a:solidFill>
+              <a:schemeClr val="tx2"/>
+            </a:solidFill>
+            <a:miter lim="800000"/>
+            <a:headEnd/>
+            <a:tailEnd/>
           </a:ln>
           <a:effectLst/>
           <a:extLst>
@@ -4370,15 +4426,20 @@
         </p:blipFill>
         <p:spPr bwMode="auto">
           <a:xfrm>
-            <a:off x="1143000" y="5638800"/>
-            <a:ext cx="7973704" cy="1161792"/>
+            <a:off x="1143000" y="4902888"/>
+            <a:ext cx="7696200" cy="1121359"/>
           </a:xfrm>
           <a:prstGeom prst="rect">
             <a:avLst/>
           </a:prstGeom>
           <a:noFill/>
-          <a:ln>
-            <a:noFill/>
+          <a:ln w="28575">
+            <a:solidFill>
+              <a:schemeClr val="tx2"/>
+            </a:solidFill>
+            <a:miter lim="800000"/>
+            <a:headEnd/>
+            <a:tailEnd/>
           </a:ln>
           <a:effectLst/>
           <a:extLst>
@@ -4422,15 +4483,18 @@
         </p:nvCxnSpPr>
         <p:spPr>
           <a:xfrm rot="10800000">
-            <a:off x="530514" y="4787556"/>
-            <a:ext cx="612486" cy="1432140"/>
+            <a:off x="545400" y="4219824"/>
+            <a:ext cx="597601" cy="1243744"/>
           </a:xfrm>
           <a:prstGeom prst="curvedConnector3">
             <a:avLst>
-              <a:gd name="adj1" fmla="val 181888"/>
+              <a:gd name="adj1" fmla="val 176807"/>
             </a:avLst>
           </a:prstGeom>
           <a:ln w="38100">
+            <a:solidFill>
+              <a:schemeClr val="tx2"/>
+            </a:solidFill>
             <a:tailEnd type="arrow"/>
           </a:ln>
         </p:spPr>
@@ -4459,6 +4523,13 @@
   <p:clrMapOvr>
     <a:masterClrMapping/>
   </p:clrMapOvr>
+  <p:timing>
+    <p:tnLst>
+      <p:par>
+        <p:cTn id="1" dur="indefinite" restart="never" nodeType="tmRoot"/>
+      </p:par>
+    </p:tnLst>
+  </p:timing>
 </p:sld>
 </file>
 
@@ -4502,15 +4573,20 @@
         </p:blipFill>
         <p:spPr bwMode="auto">
           <a:xfrm>
-            <a:off x="4800600" y="3962400"/>
-            <a:ext cx="4292953" cy="2819400"/>
+            <a:off x="4953000" y="3352800"/>
+            <a:ext cx="3944876" cy="2590800"/>
           </a:xfrm>
           <a:prstGeom prst="rect">
             <a:avLst/>
           </a:prstGeom>
           <a:noFill/>
-          <a:ln>
-            <a:noFill/>
+          <a:ln w="28575">
+            <a:solidFill>
+              <a:schemeClr val="tx2"/>
+            </a:solidFill>
+            <a:miter lim="800000"/>
+            <a:headEnd/>
+            <a:tailEnd/>
           </a:ln>
           <a:effectLst/>
           <a:extLst>
@@ -4578,7 +4654,7 @@
         </p:nvSpPr>
         <p:spPr>
           <a:xfrm>
-            <a:off x="457200" y="4343400"/>
+            <a:off x="304800" y="3505200"/>
             <a:ext cx="4648200" cy="2209799"/>
           </a:xfrm>
         </p:spPr>
@@ -4606,7 +4682,7 @@
         </p:nvSpPr>
         <p:spPr>
           <a:xfrm>
-            <a:off x="457200" y="1752600"/>
+            <a:off x="457200" y="1219200"/>
             <a:ext cx="8229600" cy="2133599"/>
           </a:xfrm>
           <a:prstGeom prst="rect">
@@ -5801,15 +5877,20 @@
         </p:blipFill>
         <p:spPr bwMode="auto">
           <a:xfrm>
-            <a:off x="37531" y="3270017"/>
-            <a:ext cx="9106469" cy="3449804"/>
+            <a:off x="990600" y="3222157"/>
+            <a:ext cx="7391400" cy="2800085"/>
           </a:xfrm>
           <a:prstGeom prst="rect">
             <a:avLst/>
           </a:prstGeom>
           <a:noFill/>
-          <a:ln>
-            <a:noFill/>
+          <a:ln w="28575">
+            <a:solidFill>
+              <a:schemeClr val="tx2"/>
+            </a:solidFill>
+            <a:miter lim="800000"/>
+            <a:headEnd/>
+            <a:tailEnd/>
           </a:ln>
           <a:effectLst/>
           <a:extLst>
@@ -6087,19 +6168,19 @@
         </p:nvSpPr>
         <p:spPr>
           <a:xfrm>
-            <a:off x="457200" y="1447799"/>
-            <a:ext cx="8229600" cy="3429001"/>
+            <a:off x="304800" y="1439917"/>
+            <a:ext cx="8229600" cy="533401"/>
           </a:xfrm>
         </p:spPr>
         <p:txBody>
           <a:bodyPr>
-            <a:normAutofit/>
+            <a:normAutofit fontScale="85000" lnSpcReduction="10000"/>
           </a:bodyPr>
           <a:lstStyle/>
           <a:p>
-            <a:pPr marL="514350" indent="-514350">
-              <a:buFont typeface="+mj-lt"/>
-              <a:buAutoNum type="arabicPeriod"/>
+            <a:pPr>
+              <a:buFont typeface="Wingdings" pitchFamily="2" charset="2"/>
+              <a:buChar char="§"/>
             </a:pPr>
             <a:r>
               <a:rPr lang="fr-FR" sz="2800" dirty="0" smtClean="0"/>
@@ -6111,47 +6192,13 @@
             </a:r>
             <a:r>
               <a:rPr lang="fr-FR" sz="2800" dirty="0" smtClean="0"/>
-              <a:t> pour déclarer l’annotation cible</a:t>
-            </a:r>
-          </a:p>
-          <a:p>
-            <a:pPr marL="514350" indent="-514350">
-              <a:buFont typeface="+mj-lt"/>
-              <a:buAutoNum type="arabicPeriod"/>
-            </a:pPr>
+              <a:t> pour déclarer l’annotation </a:t>
+            </a:r>
+            <a:r>
+              <a:rPr lang="fr-FR" sz="2800" dirty="0" smtClean="0"/>
+              <a:t>cible</a:t>
+            </a:r>
             <a:endParaRPr lang="fr-FR" sz="2800" dirty="0" smtClean="0"/>
-          </a:p>
-          <a:p>
-            <a:pPr marL="514350" indent="-514350">
-              <a:buFont typeface="+mj-lt"/>
-              <a:buAutoNum type="arabicPeriod"/>
-            </a:pPr>
-            <a:endParaRPr lang="fr-FR" sz="2800" dirty="0" smtClean="0"/>
-          </a:p>
-          <a:p>
-            <a:pPr marL="514350" indent="-514350">
-              <a:buFont typeface="+mj-lt"/>
-              <a:buAutoNum type="arabicPeriod"/>
-            </a:pPr>
-            <a:endParaRPr lang="fr-FR" sz="2800" dirty="0"/>
-          </a:p>
-          <a:p>
-            <a:pPr marL="514350" indent="-514350">
-              <a:buFont typeface="+mj-lt"/>
-              <a:buAutoNum type="arabicPeriod"/>
-            </a:pPr>
-            <a:r>
-              <a:rPr lang="fr-FR" sz="2800" dirty="0" smtClean="0"/>
-              <a:t>Créer un </a:t>
-            </a:r>
-            <a:r>
-              <a:rPr lang="fr-FR" sz="2800" dirty="0" err="1" smtClean="0"/>
-              <a:t>FileObject</a:t>
-            </a:r>
-            <a:r>
-              <a:rPr lang="fr-FR" sz="2800" dirty="0" smtClean="0"/>
-              <a:t> pour écrire du contenu</a:t>
-            </a:r>
           </a:p>
         </p:txBody>
       </p:sp>
@@ -6178,15 +6225,20 @@
         </p:blipFill>
         <p:spPr bwMode="auto">
           <a:xfrm>
-            <a:off x="62553" y="2514600"/>
-            <a:ext cx="9005247" cy="1249283"/>
+            <a:off x="228600" y="1951118"/>
+            <a:ext cx="8763000" cy="1215676"/>
           </a:xfrm>
           <a:prstGeom prst="rect">
             <a:avLst/>
           </a:prstGeom>
           <a:noFill/>
-          <a:ln>
-            <a:noFill/>
+          <a:ln w="28575">
+            <a:solidFill>
+              <a:schemeClr val="tx2"/>
+            </a:solidFill>
+            <a:miter lim="800000"/>
+            <a:headEnd/>
+            <a:tailEnd/>
           </a:ln>
           <a:effectLst/>
           <a:extLst>
@@ -6242,15 +6294,20 @@
         </p:blipFill>
         <p:spPr bwMode="auto">
           <a:xfrm>
-            <a:off x="169594" y="4492684"/>
-            <a:ext cx="8898206" cy="2289116"/>
+            <a:off x="228600" y="3810000"/>
+            <a:ext cx="8763000" cy="2254333"/>
           </a:xfrm>
           <a:prstGeom prst="rect">
             <a:avLst/>
           </a:prstGeom>
           <a:noFill/>
-          <a:ln>
-            <a:noFill/>
+          <a:ln w="28575">
+            <a:solidFill>
+              <a:schemeClr val="tx2"/>
+            </a:solidFill>
+            <a:miter lim="800000"/>
+            <a:headEnd/>
+            <a:tailEnd/>
           </a:ln>
           <a:effectLst/>
           <a:extLst>
@@ -6283,6 +6340,185 @@
           </a:extLst>
         </p:spPr>
       </p:pic>
+      <p:sp>
+        <p:nvSpPr>
+          <p:cNvPr id="6" name="Espace réservé du contenu 2"/>
+          <p:cNvSpPr txBox="1">
+            <a:spLocks/>
+          </p:cNvSpPr>
+          <p:nvPr/>
+        </p:nvSpPr>
+        <p:spPr>
+          <a:xfrm>
+            <a:off x="304800" y="3276600"/>
+            <a:ext cx="8229600" cy="457200"/>
+          </a:xfrm>
+          <a:prstGeom prst="rect">
+            <a:avLst/>
+          </a:prstGeom>
+        </p:spPr>
+        <p:txBody>
+          <a:bodyPr vert="horz" lIns="91440" tIns="45720" rIns="91440" bIns="45720" rtlCol="0">
+            <a:normAutofit fontScale="92500" lnSpcReduction="10000"/>
+          </a:bodyPr>
+          <a:lstStyle>
+            <a:lvl1pPr marL="342900" indent="-342900" algn="l" defTabSz="914400" rtl="0" eaLnBrk="1" latinLnBrk="0" hangingPunct="1">
+              <a:spcBef>
+                <a:spcPct val="20000"/>
+              </a:spcBef>
+              <a:buFont typeface="Arial" pitchFamily="34" charset="0"/>
+              <a:buChar char="•"/>
+              <a:defRPr sz="3200" kern="1200">
+                <a:solidFill>
+                  <a:schemeClr val="tx1"/>
+                </a:solidFill>
+                <a:latin typeface="+mn-lt"/>
+                <a:ea typeface="+mn-ea"/>
+                <a:cs typeface="+mn-cs"/>
+              </a:defRPr>
+            </a:lvl1pPr>
+            <a:lvl2pPr marL="742950" indent="-285750" algn="l" defTabSz="914400" rtl="0" eaLnBrk="1" latinLnBrk="0" hangingPunct="1">
+              <a:spcBef>
+                <a:spcPct val="20000"/>
+              </a:spcBef>
+              <a:buFont typeface="Arial" pitchFamily="34" charset="0"/>
+              <a:buChar char="–"/>
+              <a:defRPr sz="2800" kern="1200">
+                <a:solidFill>
+                  <a:schemeClr val="tx1"/>
+                </a:solidFill>
+                <a:latin typeface="+mn-lt"/>
+                <a:ea typeface="+mn-ea"/>
+                <a:cs typeface="+mn-cs"/>
+              </a:defRPr>
+            </a:lvl2pPr>
+            <a:lvl3pPr marL="1143000" indent="-228600" algn="l" defTabSz="914400" rtl="0" eaLnBrk="1" latinLnBrk="0" hangingPunct="1">
+              <a:spcBef>
+                <a:spcPct val="20000"/>
+              </a:spcBef>
+              <a:buFont typeface="Arial" pitchFamily="34" charset="0"/>
+              <a:buChar char="•"/>
+              <a:defRPr sz="2400" kern="1200">
+                <a:solidFill>
+                  <a:schemeClr val="tx1"/>
+                </a:solidFill>
+                <a:latin typeface="+mn-lt"/>
+                <a:ea typeface="+mn-ea"/>
+                <a:cs typeface="+mn-cs"/>
+              </a:defRPr>
+            </a:lvl3pPr>
+            <a:lvl4pPr marL="1600200" indent="-228600" algn="l" defTabSz="914400" rtl="0" eaLnBrk="1" latinLnBrk="0" hangingPunct="1">
+              <a:spcBef>
+                <a:spcPct val="20000"/>
+              </a:spcBef>
+              <a:buFont typeface="Arial" pitchFamily="34" charset="0"/>
+              <a:buChar char="–"/>
+              <a:defRPr sz="2000" kern="1200">
+                <a:solidFill>
+                  <a:schemeClr val="tx1"/>
+                </a:solidFill>
+                <a:latin typeface="+mn-lt"/>
+                <a:ea typeface="+mn-ea"/>
+                <a:cs typeface="+mn-cs"/>
+              </a:defRPr>
+            </a:lvl4pPr>
+            <a:lvl5pPr marL="2057400" indent="-228600" algn="l" defTabSz="914400" rtl="0" eaLnBrk="1" latinLnBrk="0" hangingPunct="1">
+              <a:spcBef>
+                <a:spcPct val="20000"/>
+              </a:spcBef>
+              <a:buFont typeface="Arial" pitchFamily="34" charset="0"/>
+              <a:buChar char="»"/>
+              <a:defRPr sz="2000" kern="1200">
+                <a:solidFill>
+                  <a:schemeClr val="tx1"/>
+                </a:solidFill>
+                <a:latin typeface="+mn-lt"/>
+                <a:ea typeface="+mn-ea"/>
+                <a:cs typeface="+mn-cs"/>
+              </a:defRPr>
+            </a:lvl5pPr>
+            <a:lvl6pPr marL="2514600" indent="-228600" algn="l" defTabSz="914400" rtl="0" eaLnBrk="1" latinLnBrk="0" hangingPunct="1">
+              <a:spcBef>
+                <a:spcPct val="20000"/>
+              </a:spcBef>
+              <a:buFont typeface="Arial" pitchFamily="34" charset="0"/>
+              <a:buChar char="•"/>
+              <a:defRPr sz="2000" kern="1200">
+                <a:solidFill>
+                  <a:schemeClr val="tx1"/>
+                </a:solidFill>
+                <a:latin typeface="+mn-lt"/>
+                <a:ea typeface="+mn-ea"/>
+                <a:cs typeface="+mn-cs"/>
+              </a:defRPr>
+            </a:lvl6pPr>
+            <a:lvl7pPr marL="2971800" indent="-228600" algn="l" defTabSz="914400" rtl="0" eaLnBrk="1" latinLnBrk="0" hangingPunct="1">
+              <a:spcBef>
+                <a:spcPct val="20000"/>
+              </a:spcBef>
+              <a:buFont typeface="Arial" pitchFamily="34" charset="0"/>
+              <a:buChar char="•"/>
+              <a:defRPr sz="2000" kern="1200">
+                <a:solidFill>
+                  <a:schemeClr val="tx1"/>
+                </a:solidFill>
+                <a:latin typeface="+mn-lt"/>
+                <a:ea typeface="+mn-ea"/>
+                <a:cs typeface="+mn-cs"/>
+              </a:defRPr>
+            </a:lvl7pPr>
+            <a:lvl8pPr marL="3429000" indent="-228600" algn="l" defTabSz="914400" rtl="0" eaLnBrk="1" latinLnBrk="0" hangingPunct="1">
+              <a:spcBef>
+                <a:spcPct val="20000"/>
+              </a:spcBef>
+              <a:buFont typeface="Arial" pitchFamily="34" charset="0"/>
+              <a:buChar char="•"/>
+              <a:defRPr sz="2000" kern="1200">
+                <a:solidFill>
+                  <a:schemeClr val="tx1"/>
+                </a:solidFill>
+                <a:latin typeface="+mn-lt"/>
+                <a:ea typeface="+mn-ea"/>
+                <a:cs typeface="+mn-cs"/>
+              </a:defRPr>
+            </a:lvl8pPr>
+            <a:lvl9pPr marL="3886200" indent="-228600" algn="l" defTabSz="914400" rtl="0" eaLnBrk="1" latinLnBrk="0" hangingPunct="1">
+              <a:spcBef>
+                <a:spcPct val="20000"/>
+              </a:spcBef>
+              <a:buFont typeface="Arial" pitchFamily="34" charset="0"/>
+              <a:buChar char="•"/>
+              <a:defRPr sz="2000" kern="1200">
+                <a:solidFill>
+                  <a:schemeClr val="tx1"/>
+                </a:solidFill>
+                <a:latin typeface="+mn-lt"/>
+                <a:ea typeface="+mn-ea"/>
+                <a:cs typeface="+mn-cs"/>
+              </a:defRPr>
+            </a:lvl9pPr>
+          </a:lstStyle>
+          <a:p>
+            <a:pPr>
+              <a:buFont typeface="Wingdings" pitchFamily="2" charset="2"/>
+              <a:buChar char="§"/>
+            </a:pPr>
+            <a:r>
+              <a:rPr lang="fr-FR" sz="2800" dirty="0" smtClean="0"/>
+              <a:t>Créer un </a:t>
+            </a:r>
+            <a:r>
+              <a:rPr lang="fr-FR" sz="2800" dirty="0" err="1" smtClean="0"/>
+              <a:t>FileObject</a:t>
+            </a:r>
+            <a:r>
+              <a:rPr lang="fr-FR" sz="2800" dirty="0" smtClean="0"/>
+              <a:t> pour écrire du contenu</a:t>
+            </a:r>
+            <a:endParaRPr lang="fr-FR" sz="2800" dirty="0" smtClean="0"/>
+          </a:p>
+        </p:txBody>
+      </p:sp>
     </p:spTree>
     <p:extLst>
       <p:ext uri="{BB962C8B-B14F-4D97-AF65-F5344CB8AC3E}">
@@ -6542,7 +6778,7 @@
         <p:spPr bwMode="auto">
           <a:xfrm>
             <a:off x="304800" y="1143000"/>
-            <a:ext cx="4267200" cy="5499604"/>
+            <a:ext cx="3962400" cy="5106775"/>
           </a:xfrm>
           <a:prstGeom prst="rect">
             <a:avLst/>
@@ -6605,15 +6841,20 @@
         </p:blipFill>
         <p:spPr bwMode="auto">
           <a:xfrm>
-            <a:off x="2057400" y="4004481"/>
+            <a:off x="1828800" y="3365500"/>
             <a:ext cx="7097713" cy="1739900"/>
           </a:xfrm>
           <a:prstGeom prst="rect">
             <a:avLst/>
           </a:prstGeom>
           <a:noFill/>
-          <a:ln>
-            <a:noFill/>
+          <a:ln w="28575">
+            <a:solidFill>
+              <a:schemeClr val="tx2"/>
+            </a:solidFill>
+            <a:miter lim="800000"/>
+            <a:headEnd/>
+            <a:tailEnd/>
           </a:ln>
           <a:effectLst/>
           <a:extLst>
@@ -6623,16 +6864,6 @@
                   <a:schemeClr val="accent1"/>
                 </a:solidFill>
               </a14:hiddenFill>
-            </a:ext>
-            <a:ext uri="{91240B29-F687-4F45-9708-019B960494DF}">
-              <a14:hiddenLine xmlns:a14="http://schemas.microsoft.com/office/drawing/2010/main" w="9525">
-                <a:solidFill>
-                  <a:schemeClr val="tx1"/>
-                </a:solidFill>
-                <a:miter lim="800000"/>
-                <a:headEnd/>
-                <a:tailEnd/>
-              </a14:hiddenLine>
             </a:ext>
             <a:ext uri="{AF507438-7753-43E0-B8FC-AC1667EBCBE1}">
               <a14:hiddenEffects xmlns:a14="http://schemas.microsoft.com/office/drawing/2010/main">
@@ -6656,6 +6887,13 @@
   <p:clrMapOvr>
     <a:masterClrMapping/>
   </p:clrMapOvr>
+  <p:timing>
+    <p:tnLst>
+      <p:par>
+        <p:cTn id="1" dur="indefinite" restart="never" nodeType="tmRoot"/>
+      </p:par>
+    </p:tnLst>
+  </p:timing>
 </p:sld>
 </file>
 

</xml_diff>

<commit_message>
mise à jour des slides
</commit_message>
<xml_diff>
--- a/ez18n-slides/apt_in_nutshell.pptx
+++ b/ez18n-slides/apt_in_nutshell.pptx
@@ -304,7 +304,7 @@
           <a:p>
             <a:fld id="{44BDE56E-FDAD-435D-9C14-6892E5F1DEF0}" type="datetimeFigureOut">
               <a:rPr lang="fr-FR" smtClean="0"/>
-              <a:t>11/06/2012</a:t>
+              <a:t>12/06/2012</a:t>
             </a:fld>
             <a:endParaRPr lang="fr-FR"/>
           </a:p>
@@ -481,7 +481,7 @@
           <a:p>
             <a:fld id="{44BDE56E-FDAD-435D-9C14-6892E5F1DEF0}" type="datetimeFigureOut">
               <a:rPr lang="fr-FR" smtClean="0"/>
-              <a:t>11/06/2012</a:t>
+              <a:t>12/06/2012</a:t>
             </a:fld>
             <a:endParaRPr lang="fr-FR"/>
           </a:p>
@@ -661,7 +661,7 @@
           <a:p>
             <a:fld id="{44BDE56E-FDAD-435D-9C14-6892E5F1DEF0}" type="datetimeFigureOut">
               <a:rPr lang="fr-FR" smtClean="0"/>
-              <a:t>11/06/2012</a:t>
+              <a:t>12/06/2012</a:t>
             </a:fld>
             <a:endParaRPr lang="fr-FR"/>
           </a:p>
@@ -831,7 +831,7 @@
           <a:p>
             <a:fld id="{44BDE56E-FDAD-435D-9C14-6892E5F1DEF0}" type="datetimeFigureOut">
               <a:rPr lang="fr-FR" smtClean="0"/>
-              <a:t>11/06/2012</a:t>
+              <a:t>12/06/2012</a:t>
             </a:fld>
             <a:endParaRPr lang="fr-FR"/>
           </a:p>
@@ -1084,7 +1084,7 @@
           <a:p>
             <a:fld id="{44BDE56E-FDAD-435D-9C14-6892E5F1DEF0}" type="datetimeFigureOut">
               <a:rPr lang="fr-FR" smtClean="0"/>
-              <a:t>11/06/2012</a:t>
+              <a:t>12/06/2012</a:t>
             </a:fld>
             <a:endParaRPr lang="fr-FR"/>
           </a:p>
@@ -1372,7 +1372,7 @@
           <a:p>
             <a:fld id="{44BDE56E-FDAD-435D-9C14-6892E5F1DEF0}" type="datetimeFigureOut">
               <a:rPr lang="fr-FR" smtClean="0"/>
-              <a:t>11/06/2012</a:t>
+              <a:t>12/06/2012</a:t>
             </a:fld>
             <a:endParaRPr lang="fr-FR"/>
           </a:p>
@@ -1794,7 +1794,7 @@
           <a:p>
             <a:fld id="{44BDE56E-FDAD-435D-9C14-6892E5F1DEF0}" type="datetimeFigureOut">
               <a:rPr lang="fr-FR" smtClean="0"/>
-              <a:t>11/06/2012</a:t>
+              <a:t>12/06/2012</a:t>
             </a:fld>
             <a:endParaRPr lang="fr-FR"/>
           </a:p>
@@ -1912,7 +1912,7 @@
           <a:p>
             <a:fld id="{44BDE56E-FDAD-435D-9C14-6892E5F1DEF0}" type="datetimeFigureOut">
               <a:rPr lang="fr-FR" smtClean="0"/>
-              <a:t>11/06/2012</a:t>
+              <a:t>12/06/2012</a:t>
             </a:fld>
             <a:endParaRPr lang="fr-FR"/>
           </a:p>
@@ -2007,7 +2007,7 @@
           <a:p>
             <a:fld id="{44BDE56E-FDAD-435D-9C14-6892E5F1DEF0}" type="datetimeFigureOut">
               <a:rPr lang="fr-FR" smtClean="0"/>
-              <a:t>11/06/2012</a:t>
+              <a:t>12/06/2012</a:t>
             </a:fld>
             <a:endParaRPr lang="fr-FR"/>
           </a:p>
@@ -2284,7 +2284,7 @@
           <a:p>
             <a:fld id="{44BDE56E-FDAD-435D-9C14-6892E5F1DEF0}" type="datetimeFigureOut">
               <a:rPr lang="fr-FR" smtClean="0"/>
-              <a:t>11/06/2012</a:t>
+              <a:t>12/06/2012</a:t>
             </a:fld>
             <a:endParaRPr lang="fr-FR"/>
           </a:p>
@@ -2537,7 +2537,7 @@
           <a:p>
             <a:fld id="{44BDE56E-FDAD-435D-9C14-6892E5F1DEF0}" type="datetimeFigureOut">
               <a:rPr lang="fr-FR" smtClean="0"/>
-              <a:t>11/06/2012</a:t>
+              <a:t>12/06/2012</a:t>
             </a:fld>
             <a:endParaRPr lang="fr-FR"/>
           </a:p>
@@ -2780,7 +2780,7 @@
           <a:p>
             <a:fld id="{44BDE56E-FDAD-435D-9C14-6892E5F1DEF0}" type="datetimeFigureOut">
               <a:rPr lang="fr-FR" smtClean="0"/>
-              <a:t>11/06/2012</a:t>
+              <a:t>12/06/2012</a:t>
             </a:fld>
             <a:endParaRPr lang="fr-FR"/>
           </a:p>
@@ -3524,8 +3524,13 @@
             </a:pPr>
             <a:r>
               <a:rPr lang="fr-FR" dirty="0" smtClean="0"/>
-              <a:t>Le code client ne doit pas avoir de références sur le code générer</a:t>
-            </a:r>
+              <a:t>Le code client ne doit pas avoir de références sur le code </a:t>
+            </a:r>
+            <a:r>
+              <a:rPr lang="fr-FR" dirty="0" smtClean="0"/>
+              <a:t>généré</a:t>
+            </a:r>
+            <a:endParaRPr lang="fr-FR" dirty="0" smtClean="0"/>
           </a:p>
           <a:p>
             <a:pPr>
@@ -3534,7 +3539,19 @@
             </a:pPr>
             <a:r>
               <a:rPr lang="fr-FR" dirty="0" smtClean="0"/>
-              <a:t>Possibilité de mixer le code générer avec des annotation interprétées à </a:t>
+              <a:t>Possibilité </a:t>
+            </a:r>
+            <a:r>
+              <a:rPr lang="fr-FR" dirty="0" smtClean="0"/>
+              <a:t>de mixer le code </a:t>
+            </a:r>
+            <a:r>
+              <a:rPr lang="fr-FR" dirty="0" smtClean="0"/>
+              <a:t>généré </a:t>
+            </a:r>
+            <a:r>
+              <a:rPr lang="fr-FR" dirty="0" smtClean="0"/>
+              <a:t>avec des annotation interprétées à </a:t>
             </a:r>
             <a:r>
               <a:rPr lang="fr-FR" dirty="0" err="1" smtClean="0"/>
@@ -5738,8 +5755,8 @@
         </p:nvSpPr>
         <p:spPr>
           <a:xfrm>
-            <a:off x="457200" y="1600201"/>
-            <a:ext cx="8229600" cy="1219199"/>
+            <a:off x="228600" y="1600201"/>
+            <a:ext cx="8686800" cy="1219199"/>
           </a:xfrm>
         </p:spPr>
         <p:txBody>
@@ -6877,7 +6894,7 @@
             <p:ph idx="1"/>
             <p:extLst>
               <p:ext uri="{D42A27DB-BD31-4B8C-83A1-F6EECF244321}">
-                <p14:modId xmlns:p14="http://schemas.microsoft.com/office/powerpoint/2010/main" val="1012030543"/>
+                <p14:modId xmlns:p14="http://schemas.microsoft.com/office/powerpoint/2010/main" val="2608848151"/>
               </p:ext>
             </p:extLst>
           </p:nvPr>
@@ -6994,7 +7011,11 @@
                     <a:p>
                       <a:r>
                         <a:rPr lang="fr-FR" dirty="0" smtClean="0"/>
-                        <a:t>Field</a:t>
+                        <a:t>Field, </a:t>
+                      </a:r>
+                      <a:r>
+                        <a:rPr lang="fr-FR" dirty="0" err="1" smtClean="0"/>
+                        <a:t>Parameter</a:t>
                       </a:r>
                       <a:endParaRPr lang="fr-FR" dirty="0"/>
                     </a:p>
@@ -7132,7 +7153,18 @@
               <a:rPr lang="fr-FR" sz="2800" dirty="0" err="1" smtClean="0"/>
               <a:t>instanceOf</a:t>
             </a:r>
-            <a:endParaRPr lang="fr-FR" sz="2800" dirty="0"/>
+            <a:r>
+              <a:rPr lang="fr-FR" sz="2800" dirty="0"/>
+              <a:t>, NO </a:t>
+            </a:r>
+            <a:r>
+              <a:rPr lang="fr-FR" sz="2800" dirty="0" err="1"/>
+              <a:t>isAssignable</a:t>
+            </a:r>
+            <a:r>
+              <a:rPr lang="fr-FR" sz="2800" dirty="0"/>
+              <a:t>()</a:t>
+            </a:r>
           </a:p>
           <a:p>
             <a:pPr marL="285750" indent="-285750">
@@ -7140,17 +7172,26 @@
               <a:buChar char="•"/>
             </a:pPr>
             <a:r>
+              <a:rPr lang="fr-FR" sz="2800" dirty="0"/>
+              <a:t>NO </a:t>
+            </a:r>
+            <a:r>
+              <a:rPr lang="fr-FR" sz="2800" dirty="0" err="1" smtClean="0"/>
+              <a:t>getConstructor</a:t>
+            </a:r>
+            <a:r>
+              <a:rPr lang="fr-FR" sz="2800" dirty="0"/>
+              <a:t>, </a:t>
+            </a:r>
+            <a:r>
+              <a:rPr lang="fr-FR" sz="2800" dirty="0" err="1" smtClean="0"/>
+              <a:t>getMethod</a:t>
+            </a:r>
+            <a:r>
               <a:rPr lang="fr-FR" sz="2800" dirty="0" smtClean="0"/>
-              <a:t>NO </a:t>
-            </a:r>
-            <a:r>
-              <a:rPr lang="fr-FR" sz="2800" dirty="0" err="1" smtClean="0"/>
-              <a:t>isAssignable</a:t>
-            </a:r>
-            <a:r>
-              <a:rPr lang="fr-FR" sz="2800" dirty="0" smtClean="0"/>
-              <a:t>()</a:t>
-            </a:r>
+              <a:t>, …</a:t>
+            </a:r>
+            <a:endParaRPr lang="fr-FR" sz="2800" dirty="0"/>
           </a:p>
           <a:p>
             <a:pPr marL="285750" indent="-285750">
@@ -7159,7 +7200,11 @@
             </a:pPr>
             <a:r>
               <a:rPr lang="fr-FR" sz="2800" dirty="0" smtClean="0"/>
-              <a:t>Impossible de tester l’arbre d’héritage lorsqu’on navigue dans le source d’une classe</a:t>
+              <a:t>Impossible </a:t>
+            </a:r>
+            <a:r>
+              <a:rPr lang="fr-FR" sz="2800" dirty="0" smtClean="0"/>
+              <a:t>de tester l’arbre d’héritage lorsqu’on navigue dans le source d’une classe</a:t>
             </a:r>
             <a:endParaRPr lang="fr-FR" sz="2800" dirty="0"/>
           </a:p>

</xml_diff>